<commit_message>
Update 2021-09-10 brng_stoc_snn.py 발표자료.pptx
</commit_message>
<xml_diff>
--- a/발표 자료/2021-09-10 brng_stoc_snn.py 발표자료.pptx
+++ b/발표 자료/2021-09-10 brng_stoc_snn.py 발표자료.pptx
@@ -28,6 +28,9 @@
     <p:sldId id="293" r:id="rId22"/>
     <p:sldId id="299" r:id="rId23"/>
     <p:sldId id="297" r:id="rId24"/>
+    <p:sldId id="300" r:id="rId25"/>
+    <p:sldId id="301" r:id="rId26"/>
+    <p:sldId id="302" r:id="rId27"/>
   </p:sldIdLst>
   <p:sldSz cx="12192000" cy="6858000"/>
   <p:notesSz cx="6858000" cy="9144000"/>
@@ -879,7 +882,7 @@
           <a:p>
             <a:fld id="{0DEEF2AD-A5B8-4881-A716-76B85BBF1017}" type="datetimeFigureOut">
               <a:rPr lang="ko-KR" altLang="en-US" smtClean="0"/>
-              <a:t>2021-09-09</a:t>
+              <a:t>2021-09-13</a:t>
             </a:fld>
             <a:endParaRPr lang="ko-KR" altLang="en-US"/>
           </a:p>
@@ -1130,7 +1133,7 @@
           <a:p>
             <a:fld id="{0DEEF2AD-A5B8-4881-A716-76B85BBF1017}" type="datetimeFigureOut">
               <a:rPr lang="ko-KR" altLang="en-US" smtClean="0"/>
-              <a:t>2021-09-09</a:t>
+              <a:t>2021-09-13</a:t>
             </a:fld>
             <a:endParaRPr lang="ko-KR" altLang="en-US"/>
           </a:p>
@@ -1444,7 +1447,7 @@
           <a:p>
             <a:fld id="{0DEEF2AD-A5B8-4881-A716-76B85BBF1017}" type="datetimeFigureOut">
               <a:rPr lang="ko-KR" altLang="en-US" smtClean="0"/>
-              <a:t>2021-09-09</a:t>
+              <a:t>2021-09-13</a:t>
             </a:fld>
             <a:endParaRPr lang="ko-KR" altLang="en-US"/>
           </a:p>
@@ -1777,7 +1780,7 @@
           <a:p>
             <a:fld id="{0DEEF2AD-A5B8-4881-A716-76B85BBF1017}" type="datetimeFigureOut">
               <a:rPr lang="ko-KR" altLang="en-US" smtClean="0"/>
-              <a:t>2021-09-09</a:t>
+              <a:t>2021-09-13</a:t>
             </a:fld>
             <a:endParaRPr lang="ko-KR" altLang="en-US"/>
           </a:p>
@@ -2091,7 +2094,7 @@
           <a:p>
             <a:fld id="{0DEEF2AD-A5B8-4881-A716-76B85BBF1017}" type="datetimeFigureOut">
               <a:rPr lang="ko-KR" altLang="en-US" smtClean="0"/>
-              <a:t>2021-09-09</a:t>
+              <a:t>2021-09-13</a:t>
             </a:fld>
             <a:endParaRPr lang="ko-KR" altLang="en-US"/>
           </a:p>
@@ -2484,7 +2487,7 @@
           <a:p>
             <a:fld id="{0DEEF2AD-A5B8-4881-A716-76B85BBF1017}" type="datetimeFigureOut">
               <a:rPr lang="ko-KR" altLang="en-US" smtClean="0"/>
-              <a:t>2021-09-09</a:t>
+              <a:t>2021-09-13</a:t>
             </a:fld>
             <a:endParaRPr lang="ko-KR" altLang="en-US"/>
           </a:p>
@@ -2654,7 +2657,7 @@
           <a:p>
             <a:fld id="{0DEEF2AD-A5B8-4881-A716-76B85BBF1017}" type="datetimeFigureOut">
               <a:rPr lang="ko-KR" altLang="en-US" smtClean="0"/>
-              <a:t>2021-09-09</a:t>
+              <a:t>2021-09-13</a:t>
             </a:fld>
             <a:endParaRPr lang="ko-KR" altLang="en-US"/>
           </a:p>
@@ -2834,7 +2837,7 @@
           <a:p>
             <a:fld id="{0DEEF2AD-A5B8-4881-A716-76B85BBF1017}" type="datetimeFigureOut">
               <a:rPr lang="ko-KR" altLang="en-US" smtClean="0"/>
-              <a:t>2021-09-09</a:t>
+              <a:t>2021-09-13</a:t>
             </a:fld>
             <a:endParaRPr lang="ko-KR" altLang="en-US"/>
           </a:p>
@@ -3004,7 +3007,7 @@
           <a:p>
             <a:fld id="{0DEEF2AD-A5B8-4881-A716-76B85BBF1017}" type="datetimeFigureOut">
               <a:rPr lang="ko-KR" altLang="en-US" smtClean="0"/>
-              <a:t>2021-09-09</a:t>
+              <a:t>2021-09-13</a:t>
             </a:fld>
             <a:endParaRPr lang="ko-KR" altLang="en-US"/>
           </a:p>
@@ -3251,7 +3254,7 @@
           <a:p>
             <a:fld id="{0DEEF2AD-A5B8-4881-A716-76B85BBF1017}" type="datetimeFigureOut">
               <a:rPr lang="ko-KR" altLang="en-US" smtClean="0"/>
-              <a:t>2021-09-09</a:t>
+              <a:t>2021-09-13</a:t>
             </a:fld>
             <a:endParaRPr lang="ko-KR" altLang="en-US"/>
           </a:p>
@@ -3483,7 +3486,7 @@
           <a:p>
             <a:fld id="{0DEEF2AD-A5B8-4881-A716-76B85BBF1017}" type="datetimeFigureOut">
               <a:rPr lang="ko-KR" altLang="en-US" smtClean="0"/>
-              <a:t>2021-09-09</a:t>
+              <a:t>2021-09-13</a:t>
             </a:fld>
             <a:endParaRPr lang="ko-KR" altLang="en-US"/>
           </a:p>
@@ -3857,7 +3860,7 @@
           <a:p>
             <a:fld id="{0DEEF2AD-A5B8-4881-A716-76B85BBF1017}" type="datetimeFigureOut">
               <a:rPr lang="ko-KR" altLang="en-US" smtClean="0"/>
-              <a:t>2021-09-09</a:t>
+              <a:t>2021-09-13</a:t>
             </a:fld>
             <a:endParaRPr lang="ko-KR" altLang="en-US"/>
           </a:p>
@@ -3980,7 +3983,7 @@
           <a:p>
             <a:fld id="{0DEEF2AD-A5B8-4881-A716-76B85BBF1017}" type="datetimeFigureOut">
               <a:rPr lang="ko-KR" altLang="en-US" smtClean="0"/>
-              <a:t>2021-09-09</a:t>
+              <a:t>2021-09-13</a:t>
             </a:fld>
             <a:endParaRPr lang="ko-KR" altLang="en-US"/>
           </a:p>
@@ -4075,7 +4078,7 @@
           <a:p>
             <a:fld id="{0DEEF2AD-A5B8-4881-A716-76B85BBF1017}" type="datetimeFigureOut">
               <a:rPr lang="ko-KR" altLang="en-US" smtClean="0"/>
-              <a:t>2021-09-09</a:t>
+              <a:t>2021-09-13</a:t>
             </a:fld>
             <a:endParaRPr lang="ko-KR" altLang="en-US"/>
           </a:p>
@@ -4330,7 +4333,7 @@
           <a:p>
             <a:fld id="{0DEEF2AD-A5B8-4881-A716-76B85BBF1017}" type="datetimeFigureOut">
               <a:rPr lang="ko-KR" altLang="en-US" smtClean="0"/>
-              <a:t>2021-09-09</a:t>
+              <a:t>2021-09-13</a:t>
             </a:fld>
             <a:endParaRPr lang="ko-KR" altLang="en-US"/>
           </a:p>
@@ -4635,7 +4638,7 @@
           <a:p>
             <a:fld id="{0DEEF2AD-A5B8-4881-A716-76B85BBF1017}" type="datetimeFigureOut">
               <a:rPr lang="ko-KR" altLang="en-US" smtClean="0"/>
-              <a:t>2021-09-09</a:t>
+              <a:t>2021-09-13</a:t>
             </a:fld>
             <a:endParaRPr lang="ko-KR" altLang="en-US"/>
           </a:p>
@@ -5337,7 +5340,7 @@
           <a:p>
             <a:fld id="{0DEEF2AD-A5B8-4881-A716-76B85BBF1017}" type="datetimeFigureOut">
               <a:rPr lang="ko-KR" altLang="en-US" smtClean="0"/>
-              <a:t>2021-09-09</a:t>
+              <a:t>2021-09-13</a:t>
             </a:fld>
             <a:endParaRPr lang="ko-KR" altLang="en-US"/>
           </a:p>
@@ -7381,10 +7384,250 @@
           <a:chExt cx="0" cy="0"/>
         </a:xfrm>
       </p:grpSpPr>
+      <p:pic>
+        <p:nvPicPr>
+          <p:cNvPr id="3" name="그림 2">
+            <a:extLst>
+              <a:ext uri="{FF2B5EF4-FFF2-40B4-BE49-F238E27FC236}">
+                <a16:creationId xmlns:a16="http://schemas.microsoft.com/office/drawing/2014/main" id="{F93C6C56-32DB-43D4-BCCF-7E4BDD2C883B}"/>
+              </a:ext>
+            </a:extLst>
+          </p:cNvPr>
+          <p:cNvPicPr>
+            <a:picLocks noChangeAspect="1"/>
+          </p:cNvPicPr>
+          <p:nvPr/>
+        </p:nvPicPr>
+        <p:blipFill>
+          <a:blip r:embed="rId2"/>
+          <a:stretch>
+            <a:fillRect/>
+          </a:stretch>
+        </p:blipFill>
+        <p:spPr>
+          <a:xfrm>
+            <a:off x="3418939" y="0"/>
+            <a:ext cx="5354122" cy="6858000"/>
+          </a:xfrm>
+          <a:prstGeom prst="rect">
+            <a:avLst/>
+          </a:prstGeom>
+        </p:spPr>
+      </p:pic>
     </p:spTree>
     <p:extLst>
       <p:ext uri="{BB962C8B-B14F-4D97-AF65-F5344CB8AC3E}">
         <p14:creationId xmlns:p14="http://schemas.microsoft.com/office/powerpoint/2010/main" val="968878870"/>
+      </p:ext>
+    </p:extLst>
+  </p:cSld>
+  <p:clrMapOvr>
+    <a:masterClrMapping/>
+  </p:clrMapOvr>
+</p:sld>
+</file>
+
+<file path=ppt/slides/slide24.xml><?xml version="1.0" encoding="utf-8"?>
+<p:sld xmlns:a="http://schemas.openxmlformats.org/drawingml/2006/main" xmlns:r="http://schemas.openxmlformats.org/officeDocument/2006/relationships" xmlns:p="http://schemas.openxmlformats.org/presentationml/2006/main">
+  <p:cSld>
+    <p:spTree>
+      <p:nvGrpSpPr>
+        <p:cNvPr id="1" name=""/>
+        <p:cNvGrpSpPr/>
+        <p:nvPr/>
+      </p:nvGrpSpPr>
+      <p:grpSpPr>
+        <a:xfrm>
+          <a:off x="0" y="0"/>
+          <a:ext cx="0" cy="0"/>
+          <a:chOff x="0" y="0"/>
+          <a:chExt cx="0" cy="0"/>
+        </a:xfrm>
+      </p:grpSpPr>
+      <p:pic>
+        <p:nvPicPr>
+          <p:cNvPr id="3" name="그림 2">
+            <a:extLst>
+              <a:ext uri="{FF2B5EF4-FFF2-40B4-BE49-F238E27FC236}">
+                <a16:creationId xmlns:a16="http://schemas.microsoft.com/office/drawing/2014/main" id="{99D73A30-2B9A-4029-AC72-37C1DE7B54C3}"/>
+              </a:ext>
+            </a:extLst>
+          </p:cNvPr>
+          <p:cNvPicPr>
+            <a:picLocks noChangeAspect="1"/>
+          </p:cNvPicPr>
+          <p:nvPr/>
+        </p:nvPicPr>
+        <p:blipFill>
+          <a:blip r:embed="rId2"/>
+          <a:stretch>
+            <a:fillRect/>
+          </a:stretch>
+        </p:blipFill>
+        <p:spPr>
+          <a:xfrm>
+            <a:off x="1932994" y="1220577"/>
+            <a:ext cx="8326012" cy="1638529"/>
+          </a:xfrm>
+          <a:prstGeom prst="rect">
+            <a:avLst/>
+          </a:prstGeom>
+        </p:spPr>
+      </p:pic>
+      <p:pic>
+        <p:nvPicPr>
+          <p:cNvPr id="5" name="그림 4">
+            <a:extLst>
+              <a:ext uri="{FF2B5EF4-FFF2-40B4-BE49-F238E27FC236}">
+                <a16:creationId xmlns:a16="http://schemas.microsoft.com/office/drawing/2014/main" id="{9D559826-C661-4577-B24C-E711451E1170}"/>
+              </a:ext>
+            </a:extLst>
+          </p:cNvPr>
+          <p:cNvPicPr>
+            <a:picLocks noChangeAspect="1"/>
+          </p:cNvPicPr>
+          <p:nvPr/>
+        </p:nvPicPr>
+        <p:blipFill>
+          <a:blip r:embed="rId3"/>
+          <a:stretch>
+            <a:fillRect/>
+          </a:stretch>
+        </p:blipFill>
+        <p:spPr>
+          <a:xfrm>
+            <a:off x="1581057" y="3661801"/>
+            <a:ext cx="8677949" cy="1326511"/>
+          </a:xfrm>
+          <a:prstGeom prst="rect">
+            <a:avLst/>
+          </a:prstGeom>
+        </p:spPr>
+      </p:pic>
+    </p:spTree>
+    <p:extLst>
+      <p:ext uri="{BB962C8B-B14F-4D97-AF65-F5344CB8AC3E}">
+        <p14:creationId xmlns:p14="http://schemas.microsoft.com/office/powerpoint/2010/main" val="2755006764"/>
+      </p:ext>
+    </p:extLst>
+  </p:cSld>
+  <p:clrMapOvr>
+    <a:masterClrMapping/>
+  </p:clrMapOvr>
+</p:sld>
+</file>
+
+<file path=ppt/slides/slide25.xml><?xml version="1.0" encoding="utf-8"?>
+<p:sld xmlns:a="http://schemas.openxmlformats.org/drawingml/2006/main" xmlns:r="http://schemas.openxmlformats.org/officeDocument/2006/relationships" xmlns:p="http://schemas.openxmlformats.org/presentationml/2006/main">
+  <p:cSld>
+    <p:spTree>
+      <p:nvGrpSpPr>
+        <p:cNvPr id="1" name=""/>
+        <p:cNvGrpSpPr/>
+        <p:nvPr/>
+      </p:nvGrpSpPr>
+      <p:grpSpPr>
+        <a:xfrm>
+          <a:off x="0" y="0"/>
+          <a:ext cx="0" cy="0"/>
+          <a:chOff x="0" y="0"/>
+          <a:chExt cx="0" cy="0"/>
+        </a:xfrm>
+      </p:grpSpPr>
+      <p:pic>
+        <p:nvPicPr>
+          <p:cNvPr id="3" name="그림 2">
+            <a:extLst>
+              <a:ext uri="{FF2B5EF4-FFF2-40B4-BE49-F238E27FC236}">
+                <a16:creationId xmlns:a16="http://schemas.microsoft.com/office/drawing/2014/main" id="{FCE6DF2A-2DB4-48EF-878A-96F98090B911}"/>
+              </a:ext>
+            </a:extLst>
+          </p:cNvPr>
+          <p:cNvPicPr>
+            <a:picLocks noChangeAspect="1"/>
+          </p:cNvPicPr>
+          <p:nvPr/>
+        </p:nvPicPr>
+        <p:blipFill>
+          <a:blip r:embed="rId2"/>
+          <a:stretch>
+            <a:fillRect/>
+          </a:stretch>
+        </p:blipFill>
+        <p:spPr>
+          <a:xfrm>
+            <a:off x="2477899" y="778181"/>
+            <a:ext cx="7154272" cy="1883347"/>
+          </a:xfrm>
+          <a:prstGeom prst="rect">
+            <a:avLst/>
+          </a:prstGeom>
+        </p:spPr>
+      </p:pic>
+      <p:pic>
+        <p:nvPicPr>
+          <p:cNvPr id="5" name="그림 4">
+            <a:extLst>
+              <a:ext uri="{FF2B5EF4-FFF2-40B4-BE49-F238E27FC236}">
+                <a16:creationId xmlns:a16="http://schemas.microsoft.com/office/drawing/2014/main" id="{E5E7AD8F-44E6-4AF0-91A3-29CB130211FF}"/>
+              </a:ext>
+            </a:extLst>
+          </p:cNvPr>
+          <p:cNvPicPr>
+            <a:picLocks noChangeAspect="1"/>
+          </p:cNvPicPr>
+          <p:nvPr/>
+        </p:nvPicPr>
+        <p:blipFill>
+          <a:blip r:embed="rId3"/>
+          <a:stretch>
+            <a:fillRect/>
+          </a:stretch>
+        </p:blipFill>
+        <p:spPr>
+          <a:xfrm>
+            <a:off x="2518862" y="3380940"/>
+            <a:ext cx="7154273" cy="2581635"/>
+          </a:xfrm>
+          <a:prstGeom prst="rect">
+            <a:avLst/>
+          </a:prstGeom>
+        </p:spPr>
+      </p:pic>
+    </p:spTree>
+    <p:extLst>
+      <p:ext uri="{BB962C8B-B14F-4D97-AF65-F5344CB8AC3E}">
+        <p14:creationId xmlns:p14="http://schemas.microsoft.com/office/powerpoint/2010/main" val="852967541"/>
+      </p:ext>
+    </p:extLst>
+  </p:cSld>
+  <p:clrMapOvr>
+    <a:masterClrMapping/>
+  </p:clrMapOvr>
+</p:sld>
+</file>
+
+<file path=ppt/slides/slide26.xml><?xml version="1.0" encoding="utf-8"?>
+<p:sld xmlns:a="http://schemas.openxmlformats.org/drawingml/2006/main" xmlns:r="http://schemas.openxmlformats.org/officeDocument/2006/relationships" xmlns:p="http://schemas.openxmlformats.org/presentationml/2006/main">
+  <p:cSld>
+    <p:spTree>
+      <p:nvGrpSpPr>
+        <p:cNvPr id="1" name=""/>
+        <p:cNvGrpSpPr/>
+        <p:nvPr/>
+      </p:nvGrpSpPr>
+      <p:grpSpPr>
+        <a:xfrm>
+          <a:off x="0" y="0"/>
+          <a:ext cx="0" cy="0"/>
+          <a:chOff x="0" y="0"/>
+          <a:chExt cx="0" cy="0"/>
+        </a:xfrm>
+      </p:grpSpPr>
+    </p:spTree>
+    <p:extLst>
+      <p:ext uri="{BB962C8B-B14F-4D97-AF65-F5344CB8AC3E}">
+        <p14:creationId xmlns:p14="http://schemas.microsoft.com/office/powerpoint/2010/main" val="4032424341"/>
       </p:ext>
     </p:extLst>
   </p:cSld>

</xml_diff>